<commit_message>
Live Lecture 15 update
</commit_message>
<xml_diff>
--- a/lectures/lecture-15/Lecture-Live/Lecture 15 - Lecture.pptx
+++ b/lectures/lecture-15/Lecture-Live/Lecture 15 - Lecture.pptx
@@ -141,6 +141,134 @@
     </p:ext>
   </p:extLst>
 </p:presentation>
+</file>
+
+<file path=ppt/ink/ink1.xml><?xml version="1.0" encoding="utf-8"?>
+<inkml:ink xmlns:inkml="http://www.w3.org/2003/InkML">
+  <inkml:definitions>
+    <inkml:context xml:id="ctx0">
+      <inkml:inkSource xml:id="inkSrc0">
+        <inkml:traceFormat>
+          <inkml:channel name="X" type="integer" min="-2.14748E9" max="2.14748E9" units="cm"/>
+          <inkml:channel name="Y" type="integer" min="-2.14748E9" max="2.14748E9" units="cm"/>
+          <inkml:channel name="F" type="integer" max="32767" units="dev"/>
+          <inkml:channel name="OA" type="integer" max="360" units="deg"/>
+          <inkml:channel name="OE" type="integer" max="90" units="deg"/>
+        </inkml:traceFormat>
+        <inkml:channelProperties>
+          <inkml:channelProperty channel="X" name="resolution" value="1000" units="1/cm"/>
+          <inkml:channelProperty channel="Y" name="resolution" value="1000" units="1/cm"/>
+          <inkml:channelProperty channel="F" name="resolution" value="0" units="1/dev"/>
+          <inkml:channelProperty channel="OA" name="resolution" value="1000" units="1/deg"/>
+          <inkml:channelProperty channel="OE" name="resolution" value="1000" units="1/deg"/>
+        </inkml:channelProperties>
+      </inkml:inkSource>
+      <inkml:timestamp xml:id="ts0" timeString="2021-05-03T19:00:34.807"/>
+    </inkml:context>
+    <inkml:brush xml:id="br0">
+      <inkml:brushProperty name="width" value="0.05" units="cm"/>
+      <inkml:brushProperty name="height" value="0.05" units="cm"/>
+      <inkml:brushProperty name="color" value="#E71224"/>
+    </inkml:brush>
+  </inkml:definitions>
+  <inkml:trace contextRef="#ctx0" brushRef="#br0">69 184 1840 0 0,'0'0'83'0'0,"0"1"-6"0"0,-2 3-61 0 0,-8 3 2053 0 0,9-7-1270 0 0,0 1-1 0 0,0-1 1 0 0,0 0-1 0 0,0 1 1 0 0,0-1 0 0 0,-1 0-1 0 0,1 1 1 0 0,0-1-1 0 0,0 0 1 0 0,0 0-1 0 0,0 0 1 0 0,-2 0 0 0 0,-1-1 334 0 0,3 1-789 0 0,0 0 0 0 0,0 0 0 0 0,0-1 0 0 0,0 1 1 0 0,0 0-1 0 0,0-1 0 0 0,0 1 0 0 0,1-1 0 0 0,-1 1 0 0 0,0-1 1 0 0,0 0-1 0 0,0 1 0 0 0,1-1 0 0 0,-1 0 0 0 0,0 0 1 0 0,1 1-1 0 0,-2-2 0 0 0,-9-16 1625 0 0,10 15-2096 0 0,-4 0 1000 0 0,5 3-851 0 0,0 0 0 0 0,0 0 0 0 0,0 0 0 0 0,0 0 0 0 0,-1 0 0 0 0,1 0 1 0 0,0 0-1 0 0,0 0 0 0 0,0 0 0 0 0,0 0 0 0 0,0 0 0 0 0,0 0 0 0 0,0 0 0 0 0,-1 0 1 0 0,1 0-1 0 0,0 0 0 0 0,0-1 0 0 0,0 1 0 0 0,0 0 0 0 0,0 0 0 0 0,0 0 1 0 0,0 0-1 0 0,0 0 0 0 0,0 0 0 0 0,0 0 0 0 0,-1 0 0 0 0,1-1 0 0 0,0 1 0 0 0,0 0 1 0 0,0 0-1 0 0,0 0 0 0 0,0 0 0 0 0,0 0 0 0 0,0 0 0 0 0,0-1 0 0 0,0 1 1 0 0,0 0-1 0 0,0 0 0 0 0,0 0 0 0 0,0 0 0 0 0,0 0 0 0 0,0-1 0 0 0,0 1 0 0 0,1 0 1 0 0,-1 0-1 0 0,0 0 0 0 0,-1-7 579 0 0,1 7-588 0 0,0-1 1 0 0,-1 1-1 0 0,1 0 1 0 0,0 0-1 0 0,0 0 1 0 0,0 0-1 0 0,0-1 1 0 0,0 1-1 0 0,0 0 0 0 0,0 0 1 0 0,0 0-1 0 0,0 0 1 0 0,0-1-1 0 0,0 1 1 0 0,0 0-1 0 0,0 0 1 0 0,0 0-1 0 0,0 0 1 0 0,0-1-1 0 0,0 1 0 0 0,0 0 1 0 0,1 0-1 0 0,-1 0 1 0 0,0 0-1 0 0,0 0 1 0 0,0-1-1 0 0,0 1 1 0 0,0 0-1 0 0,0 0 0 0 0,0 0 1 0 0,0 0-1 0 0,1 0 1 0 0,-1 0-1 0 0,0-1 1 0 0,0 1-1 0 0,0 0 1 0 0,0 0-1 0 0,0 0 1 0 0,1 0-1 0 0,-1 0 0 0 0,0 0 1 0 0,0 0-1 0 0,0 0 1 0 0,0 0-1 0 0,1 0 1 0 0,-1 0-1 0 0,1-1 99 0 0,0 1-76 0 0,0-1 0 0 0,0 0 0 0 0,0 1-1 0 0,0-1 1 0 0,0 1 0 0 0,0-1 0 0 0,0 1 0 0 0,0 0-1 0 0,0-1 1 0 0,0 1 0 0 0,1 0 0 0 0,-1 0 0 0 0,0 0 0 0 0,0-1-1 0 0,0 1 1 0 0,3 1 0 0 0,6-3 51 0 0,1 2-21 0 0,-1-1-1 0 0,18 2 1 0 0,-17 0-21 0 0,-1 0 0 0 0,16-3 0 0 0,58-7 186 0 0,51-5 86 0 0,-88 7-254 0 0,-29 4-359 0 0,33-1 0 0 0,108-9 890 0 0,-93 5-403 0 0,-50 8-191 0 0,25 1 0 0 0,-2 1 0 0 0,281-28 382 0 0,-240 17-328 0 0,30-9 70 0 0,-51 10-111 0 0,87-9 38 0 0,11 12 13 0 0,-84 5-8 0 0,-1 4 0 0 0,136 25 0 0 0,-148-15-56 0 0,43 9 0 0 0,27-1 83 0 0,84 11 51 0 0,-60-29-21 0 0,-60-4-172 0 0,-67 1 220 0 0,281-1 1271 0 0,-113-4-1200 0 0,-194 4-232 0 0,1 0 0 0 0,1 0 0 0 0,-1-1 0 0 0,1 1 0 0 0,-1 0 0 0 0,1-1 0 0 0,-1 0 0 0 0,1 1 0 0 0,3-3 0 0 0,-4 2-260 0 0,-1 0-1 0 0,0 1 1 0 0,1-1-1 0 0,-1 0 1 0 0,0 0-1 0 0,0 0 1 0 0,0 0-1 0 0,0 0 1 0 0,0 0-1 0 0,0-1 1 0 0,0 1-1 0 0,0 0 1 0 0,0 0-1 0 0,0-3 1 0 0,2 0-2503 0 0</inkml:trace>
+</inkml:ink>
+</file>
+
+<file path=ppt/ink/ink2.xml><?xml version="1.0" encoding="utf-8"?>
+<inkml:ink xmlns:inkml="http://www.w3.org/2003/InkML">
+  <inkml:definitions>
+    <inkml:context xml:id="ctx0">
+      <inkml:inkSource xml:id="inkSrc0">
+        <inkml:traceFormat>
+          <inkml:channel name="X" type="integer" min="-2.14748E9" max="2.14748E9" units="cm"/>
+          <inkml:channel name="Y" type="integer" min="-2.14748E9" max="2.14748E9" units="cm"/>
+          <inkml:channel name="F" type="integer" max="32767" units="dev"/>
+          <inkml:channel name="OA" type="integer" max="360" units="deg"/>
+          <inkml:channel name="OE" type="integer" max="90" units="deg"/>
+        </inkml:traceFormat>
+        <inkml:channelProperties>
+          <inkml:channelProperty channel="X" name="resolution" value="1000" units="1/cm"/>
+          <inkml:channelProperty channel="Y" name="resolution" value="1000" units="1/cm"/>
+          <inkml:channelProperty channel="F" name="resolution" value="0" units="1/dev"/>
+          <inkml:channelProperty channel="OA" name="resolution" value="1000" units="1/deg"/>
+          <inkml:channelProperty channel="OE" name="resolution" value="1000" units="1/deg"/>
+        </inkml:channelProperties>
+      </inkml:inkSource>
+      <inkml:timestamp xml:id="ts0" timeString="2021-05-03T19:00:39.606"/>
+    </inkml:context>
+    <inkml:brush xml:id="br0">
+      <inkml:brushProperty name="width" value="0.05" units="cm"/>
+      <inkml:brushProperty name="height" value="0.05" units="cm"/>
+      <inkml:brushProperty name="color" value="#E71224"/>
+    </inkml:brush>
+  </inkml:definitions>
+  <inkml:trace contextRef="#ctx0" brushRef="#br0">74 63 5928 0 0,'-4'-10'266'0'0,"3"8"1"0"0,-14 12 2609 0 0,-1-8-423 0 0,12-2-437 0 0,0 1-786 0 0,4-1-1171 0 0,0 0 0 0 0,0 0 1 0 0,0 0-1 0 0,-1 0 0 0 0,1 0 1 0 0,0 0-1 0 0,0 0 0 0 0,-1 0 0 0 0,1 0 1 0 0,0 0-1 0 0,0 0 0 0 0,-1 0 1 0 0,1 0-1 0 0,0 0 0 0 0,0 0 0 0 0,-1 0 1 0 0,1 0-1 0 0,0-1 0 0 0,0 1 1 0 0,0 0-1 0 0,-1 0 0 0 0,1 0 0 0 0,0 0 1 0 0,0 0-1 0 0,0-1 0 0 0,0 1 1 0 0,-1 0-1 0 0,1 0 0 0 0,0 0 1 0 0,0-1-1 0 0,0 1 0 0 0,0 0 0 0 0,0 0 1 0 0,0-1-1 0 0,-1 1 0 0 0,1 0 1 0 0,0 0-1 0 0,0 0 0 0 0,0-1 0 0 0,0 1 87 0 0,0-1-1 0 0,0 1 0 0 0,-1-1 1 0 0,1 1-1 0 0,0-1 0 0 0,-1 1 1 0 0,1-1-1 0 0,0 1 0 0 0,-1 0 1 0 0,1-1-1 0 0,-1 1 0 0 0,1 0 1 0 0,-1-1-1 0 0,1 1 0 0 0,-1 0 1 0 0,1 0-1 0 0,0-1 0 0 0,-1 1 1 0 0,1 0-1 0 0,-1 0 0 0 0,0 0 1 0 0,1 0-1 0 0,-1 0 0 0 0,1 0 1 0 0,-1 0-1 0 0,1-1 0 0 0,-1 2 1 0 0,1-1-1 0 0,-1 0 0 0 0,1 0 1 0 0,-1 0-1 0 0,1 0 0 0 0,-1 0 1 0 0,1 0-1 0 0,-1 0 0 0 0,1 1 1 0 0,-1-1-1 0 0,0 0 0 0 0,0 1 427 0 0,-2 6 1100 0 0,3-6-1512 0 0,0-1-153 0 0,1 0 0 0 0,-1 1-1 0 0,0-1 1 0 0,1 1 0 0 0,-1-1-1 0 0,0 0 1 0 0,1 1 0 0 0,-1-1 0 0 0,0 0-1 0 0,1 0 1 0 0,-1 1 0 0 0,1-1-1 0 0,-1 0 1 0 0,0 0 0 0 0,1 0 0 0 0,-1 1-1 0 0,1-1 1 0 0,-1 0 0 0 0,1 0-1 0 0,-1 0 1 0 0,1 0 0 0 0,-1 0-1 0 0,1 0 1 0 0,12 2 320 0 0,82-2 401 0 0,-90 0-696 0 0,1 1 0 0 0,-1 0 0 0 0,0 0 0 0 0,1 0 0 0 0,-1 1 0 0 0,0-1 0 0 0,0 1 0 0 0,0 1 0 0 0,4 2 0 0 0,-4-3-19 0 0,-1 0 0 0 0,1 0 0 0 0,0-1 0 0 0,0 1 0 0 0,0-1 0 0 0,0 0 0 0 0,0 0 0 0 0,8 0 1 0 0,-9-2-6 0 0,0 0 1 0 0,1 0-1 0 0,-1 0 1 0 0,0 0-1 0 0,0-1 1 0 0,0 0-1 0 0,1 1 1 0 0,-2-2 0 0 0,1 1-1 0 0,6-5 1 0 0,-4 4 2 0 0,0-1 0 0 0,0 1 0 0 0,11-5 0 0 0,122-30 154 0 0,-109 32-104 0 0,-1 1-1 0 0,55-1 1 0 0,24 3 3 0 0,5 10-21 0 0,-49-2-33 0 0,4 0 6 0 0,78 3 32 0 0,73-1-165 0 0,-189-5 307 0 0,60 7-108 0 0,196 20 99 0 0,-161-28-182 0 0,-68-1 13 0 0,-5 0 0 0 0,46-1 41 0 0,130 16-1 0 0,-147-7 139 0 0,102-3 1 0 0,-180-5-191 0 0,85 1 201 0 0,73-2 188 0 0,338 21 447 0 0,-474-17-746 0 0,34 2 329 0 0,101-2 0 0 0,-145-4-158 0 0,-5 0-256 0 0,-1 0 0 0 0,1 0-1 0 0,0 0 1 0 0,0-1-1 0 0,11-4 1 0 0,-13 3 10 0 0,0 0 0 0 0,0-1 0 0 0,0 0 0 0 0,-1 0 0 0 0,0 0 0 0 0,1-1 0 0 0,6-6 0 0 0,5-1-1800 0 0,-16 9 616 0 0</inkml:trace>
+</inkml:ink>
+</file>
+
+<file path=ppt/ink/ink3.xml><?xml version="1.0" encoding="utf-8"?>
+<inkml:ink xmlns:inkml="http://www.w3.org/2003/InkML">
+  <inkml:definitions>
+    <inkml:context xml:id="ctx0">
+      <inkml:inkSource xml:id="inkSrc0">
+        <inkml:traceFormat>
+          <inkml:channel name="X" type="integer" min="-2.14748E9" max="2.14748E9" units="cm"/>
+          <inkml:channel name="Y" type="integer" min="-2.14748E9" max="2.14748E9" units="cm"/>
+          <inkml:channel name="F" type="integer" max="32767" units="dev"/>
+          <inkml:channel name="OA" type="integer" max="360" units="deg"/>
+          <inkml:channel name="OE" type="integer" max="90" units="deg"/>
+        </inkml:traceFormat>
+        <inkml:channelProperties>
+          <inkml:channelProperty channel="X" name="resolution" value="1000" units="1/cm"/>
+          <inkml:channelProperty channel="Y" name="resolution" value="1000" units="1/cm"/>
+          <inkml:channelProperty channel="F" name="resolution" value="0" units="1/dev"/>
+          <inkml:channelProperty channel="OA" name="resolution" value="1000" units="1/deg"/>
+          <inkml:channelProperty channel="OE" name="resolution" value="1000" units="1/deg"/>
+        </inkml:channelProperties>
+      </inkml:inkSource>
+      <inkml:timestamp xml:id="ts0" timeString="2021-05-03T19:00:41.087"/>
+    </inkml:context>
+    <inkml:brush xml:id="br0">
+      <inkml:brushProperty name="width" value="0.05" units="cm"/>
+      <inkml:brushProperty name="height" value="0.05" units="cm"/>
+      <inkml:brushProperty name="color" value="#E71224"/>
+    </inkml:brush>
+  </inkml:definitions>
+  <inkml:trace contextRef="#ctx0" brushRef="#br0">45 65 3224 0 0,'-6'-5'-1136'0'0,"-6"-1"6470"0"0,-6-6 5021 0 0,16 10-9412 0 0,2 2-742 0 0,-1-1 0 0 0,0 1 0 0 0,1-1 0 0 0,-1 0 0 0 0,1 1 0 0 0,-1-1 0 0 0,1 0 0 0 0,-1 0 0 0 0,1 1 1 0 0,0-1-1 0 0,-1 0 0 0 0,1 0 0 0 0,0 0 0 0 0,0 1 0 0 0,-1-1 0 0 0,1 0 0 0 0,0 0 0 0 0,0 0 0 0 0,0 0 1 0 0,0 0-1 0 0,0 1 0 0 0,0-1 0 0 0,0-1 0 0 0,0 1 374 0 0,20-14 802 0 0,-14 14-1273 0 0,0 0-1 0 0,-1 0 1 0 0,1 0 0 0 0,0 1-1 0 0,0 0 1 0 0,0 0 0 0 0,-1 1 0 0 0,10 1-1 0 0,48 14 1259 0 0,-32-7-1521 0 0,10 0 347 0 0,1-2 1 0 0,73 3-1 0 0,347 13-124 0 0,-125-4-384 0 0,-148-10 733 0 0,300 20 630 0 0,-27-14-1016 0 0,-420-16 195 0 0,-25 0-120 0 0,0 1-1 0 0,0 0 1 0 0,23 4 0 0 0,4 1 69 0 0,-42-5-118 0 0,0-1-82 0 0,-18-5-1622 0 0,-8 3-821 0 0,8 3 480 0 0</inkml:trace>
+</inkml:ink>
+</file>
+
+<file path=ppt/ink/ink4.xml><?xml version="1.0" encoding="utf-8"?>
+<inkml:ink xmlns:inkml="http://www.w3.org/2003/InkML">
+  <inkml:definitions>
+    <inkml:context xml:id="ctx0">
+      <inkml:inkSource xml:id="inkSrc0">
+        <inkml:traceFormat>
+          <inkml:channel name="X" type="integer" min="-2.14748E9" max="2.14748E9" units="cm"/>
+          <inkml:channel name="Y" type="integer" min="-2.14748E9" max="2.14748E9" units="cm"/>
+          <inkml:channel name="F" type="integer" max="32767" units="dev"/>
+          <inkml:channel name="OA" type="integer" max="360" units="deg"/>
+          <inkml:channel name="OE" type="integer" max="90" units="deg"/>
+        </inkml:traceFormat>
+        <inkml:channelProperties>
+          <inkml:channelProperty channel="X" name="resolution" value="1000" units="1/cm"/>
+          <inkml:channelProperty channel="Y" name="resolution" value="1000" units="1/cm"/>
+          <inkml:channelProperty channel="F" name="resolution" value="0" units="1/dev"/>
+          <inkml:channelProperty channel="OA" name="resolution" value="1000" units="1/deg"/>
+          <inkml:channelProperty channel="OE" name="resolution" value="1000" units="1/deg"/>
+        </inkml:channelProperties>
+      </inkml:inkSource>
+      <inkml:timestamp xml:id="ts0" timeString="2021-05-03T19:00:44.301"/>
+    </inkml:context>
+    <inkml:brush xml:id="br0">
+      <inkml:brushProperty name="width" value="0.05" units="cm"/>
+      <inkml:brushProperty name="height" value="0.05" units="cm"/>
+      <inkml:brushProperty name="color" value="#E71224"/>
+    </inkml:brush>
+  </inkml:definitions>
+  <inkml:trace contextRef="#ctx0" brushRef="#br0">99 7 1840 0 0,'-6'-6'4125'0'0,"5"6"-3995"0"0,1 1-92 0 0,0-1 0 0 0,-1 0 0 0 0,1 1 0 0 0,0-1 0 0 0,0 0 0 0 0,-1 1-1 0 0,1-1 1 0 0,0 0 0 0 0,-1 0 0 0 0,1 0 0 0 0,0 1 0 0 0,-1-1 0 0 0,1 0-1 0 0,-1 0 1 0 0,1 0 0 0 0,0 0 0 0 0,-1 0 0 0 0,1 1 0 0 0,-1-1 0 0 0,1 0-1 0 0,0 0 1 0 0,-1 0 0 0 0,1 0 0 0 0,-1 0 0 0 0,1 0 0 0 0,0 0 0 0 0,-1-1-1 0 0,1 1 1 0 0,-1 0 0 0 0,1 0 0 0 0,0 0 0 0 0,-1 0 0 0 0,1 0-1 0 0,-1-1 1 0 0,1 1 0 0 0,0 0 0 0 0,-1 0 0 0 0,0-1 390 0 0,1 1-336 0 0,0-1-1 0 0,-1 1 1 0 0,1 0-1 0 0,-1 0 1 0 0,1 0-1 0 0,0 0 1 0 0,-1 0 0 0 0,1 0-1 0 0,-1 0 1 0 0,1 0-1 0 0,-1 0 1 0 0,1 0-1 0 0,0 0 1 0 0,-1 0-1 0 0,1 0 1 0 0,-1 0-1 0 0,1 0 1 0 0,-1 1-1 0 0,1-1 1 0 0,0 0-1 0 0,-1 1 1 0 0,0-1 64 0 0,1 1 0 0 0,0-1 0 0 0,-1 0 1 0 0,1 1-1 0 0,0-1 0 0 0,-1 1 0 0 0,1-1 1 0 0,-1 1-1 0 0,1-1 0 0 0,-1 0 0 0 0,1 1 1 0 0,-1-1-1 0 0,1 0 0 0 0,-1 0 0 0 0,1 1 1 0 0,-1-1-1 0 0,1 0 0 0 0,-1 0 0 0 0,0 0 0 0 0,1 0 1 0 0,-1 0-1 0 0,1 0 0 0 0,-1 0 0 0 0,0 0 1 0 0,1 0-1 0 0,-2 0 0 0 0,-2 0 771 0 0,0 8 694 0 0,1-7-1333 0 0,2 0-134 0 0,0-1-1 0 0,0 0 1 0 0,-1 0 0 0 0,1 1-1 0 0,0-1 1 0 0,0 0 0 0 0,0 0-1 0 0,-1 0 1 0 0,1-1 0 0 0,0 1-1 0 0,0 0 1 0 0,0 0 0 0 0,-1-1-1 0 0,1 1 1 0 0,-2-1 0 0 0,-7 18 2331 0 0,8-16-2126 0 0,1-1-291 0 0,1 0-1 0 0,0 0 1 0 0,-1 0-1 0 0,1 0 0 0 0,0 0 1 0 0,-1 0-1 0 0,1 0 0 0 0,0 0 1 0 0,0 0-1 0 0,-1 0 1 0 0,1 0-1 0 0,0 0 0 0 0,0 0 1 0 0,-1 1-1 0 0,1-1 0 0 0,0 0 1 0 0,-1 0-1 0 0,1 0 0 0 0,0 0 1 0 0,0 1-1 0 0,0-1 1 0 0,-1 0-1 0 0,1 0 0 0 0,0 0 1 0 0,0 1-1 0 0,0-1 0 0 0,-1 0 1 0 0,1 0-1 0 0,0 1 1 0 0,0-1-1 0 0,0 0 0 0 0,0 0 1 0 0,0 1-1 0 0,0-1 0 0 0,0 0 1 0 0,0 0-1 0 0,0 1 1 0 0,-1-1-1 0 0,1 0 0 0 0,0 1 1 0 0,0-1-1 0 0,0 0 0 0 0,1 1 1 0 0,-1-1-1 0 0,0 0 0 0 0,0 0 1 0 0,0 1-1 0 0,2 8-67 0 0,3-2 51 0 0,3-4 173 0 0,-6-2-133 0 0,1 0-1 0 0,-1 0 1 0 0,0 1 0 0 0,0-1-1 0 0,1 0 1 0 0,-1 1 0 0 0,3 2-1 0 0,-3-2-53 0 0,0 1 0 0 0,0-1-1 0 0,1-1 1 0 0,-1 1 0 0 0,0 0-1 0 0,1-1 1 0 0,0 1 0 0 0,-1-1-1 0 0,1 0 1 0 0,0 1 0 0 0,0-1-1 0 0,-1-1 1 0 0,1 1 0 0 0,0 0-1 0 0,0-1 1 0 0,0 1-1 0 0,0-1 1 0 0,0 0 0 0 0,0 0-1 0 0,0 0 1 0 0,0-1 0 0 0,0 1-1 0 0,4-1 1 0 0,-1 0-1 0 0,0 1 1 0 0,0 0-1 0 0,0 1 0 0 0,0 0 0 0 0,0 0 0 0 0,-1 0 0 0 0,1 0 1 0 0,0 1-1 0 0,7 3 0 0 0,25 6 158 0 0,104 3 158 0 0,-59-7-196 0 0,29 0 168 0 0,128-6 0 0 0,-160-8-189 0 0,37 0 114 0 0,116 1 251 0 0,-186 4-375 0 0,0 1 0 0 0,-1 2 0 0 0,73 12 0 0 0,-67-8 274 0 0,74-2 0 0 0,16 2-134 0 0,-114-4-286 0 0,19 1 99 0 0,-42-1-55 0 0,-1-1 0 0 0,1 1-1 0 0,0 0 1 0 0,-1 1 0 0 0,1-1-1 0 0,-1 1 1 0 0,5 2-1 0 0,-2 0 7 0 0,-5-3-19 0 0,-1 1 1 0 0,1-1-1 0 0,0 0 1 0 0,0 0-1 0 0,0 0 1 0 0,0 0 0 0 0,0 0-1 0 0,0-1 1 0 0,0 1-1 0 0,0-1 1 0 0,0 1 0 0 0,0-1-1 0 0,0 0 1 0 0,0 0-1 0 0,0 0 1 0 0,1 0-1 0 0,2 0 1 0 0,-3-1 5 0 0,1 1 0 0 0,0-1 0 0 0,0 1-1 0 0,-1 0 1 0 0,1 0 0 0 0,0 0 0 0 0,0 0 0 0 0,-1 1 0 0 0,1-1 0 0 0,0 1 0 0 0,-1 0-1 0 0,1 0 1 0 0,0 0 0 0 0,-1 0 0 0 0,1 0 0 0 0,-1 0 0 0 0,1 1 0 0 0,-1-1-1 0 0,4 4 1 0 0,-4-4-2 0 0,-1 0-1 0 0,1 0 0 0 0,0 0 1 0 0,0-1-1 0 0,0 1 0 0 0,0-1 1 0 0,0 1-1 0 0,0-1 0 0 0,0 1 1 0 0,0-1-1 0 0,0 0 0 0 0,0 0 1 0 0,0 0-1 0 0,0 0 0 0 0,3-1 1 0 0,7 1 126 0 0,-12-1-138 0 0,1 1 0 0 0,0 0 0 0 0,-1 0 0 0 0,1-1 0 0 0,-1 1 0 0 0,1 0 0 0 0,-1-1 0 0 0,1 1 0 0 0,-1 0 1 0 0,1-1-1 0 0,-1 1 0 0 0,0-1 0 0 0,1 1 0 0 0,-1-1 0 0 0,1 1 0 0 0,-1-1 0 0 0,0 1 0 0 0,0-1 0 0 0,1 1 0 0 0,-1-1 0 0 0,0 0 1 0 0,0 1-1 0 0,0-1 0 0 0,1 1 0 0 0,-1-1 0 0 0,0 0 0 0 0,0 1 0 0 0,0-1 0 0 0,0 0 0 0 0,1-23-261 0 0,-2 20 17 0 0,2 0-172 0 0,-2-19-1388 0 0,1 22 1518 0 0,0 0 0 0 0,0 0 0 0 0,-1 0 0 0 0,1 0 0 0 0,0 0 0 0 0,0 0 0 0 0,-1 0 0 0 0,1 0 0 0 0,-1 0-1 0 0,1 0 1 0 0,-1 0 0 0 0,1 0 0 0 0,-1 0 0 0 0,1 0 0 0 0,-2-1 0 0 0</inkml:trace>
+</inkml:ink>
 </file>
 
 <file path=ppt/notesMasters/notesMaster1.xml><?xml version="1.0" encoding="utf-8"?>
@@ -4174,6 +4302,210 @@
           </a:p>
         </p:txBody>
       </p:sp>
+      <mc:AlternateContent xmlns:mc="http://schemas.openxmlformats.org/markup-compatibility/2006">
+        <mc:Choice xmlns:p14="http://schemas.microsoft.com/office/powerpoint/2010/main" Requires="p14">
+          <p:contentPart p14:bwMode="auto" r:id="rId2">
+            <p14:nvContentPartPr>
+              <p14:cNvPr id="4" name="Ink 3">
+                <a:extLst>
+                  <a:ext uri="{FF2B5EF4-FFF2-40B4-BE49-F238E27FC236}">
+                    <a16:creationId xmlns:a16="http://schemas.microsoft.com/office/drawing/2014/main" id="{D5850D95-EE8B-4B00-93A3-F2CBA9D3073C}"/>
+                  </a:ext>
+                </a:extLst>
+              </p14:cNvPr>
+              <p14:cNvContentPartPr/>
+              <p14:nvPr/>
+            </p14:nvContentPartPr>
+            <p14:xfrm>
+              <a:off x="2242009" y="1702339"/>
+              <a:ext cx="1204560" cy="71640"/>
+            </p14:xfrm>
+          </p:contentPart>
+        </mc:Choice>
+        <mc:Fallback>
+          <p:pic>
+            <p:nvPicPr>
+              <p:cNvPr id="4" name="Ink 3">
+                <a:extLst>
+                  <a:ext uri="{FF2B5EF4-FFF2-40B4-BE49-F238E27FC236}">
+                    <a16:creationId xmlns:a16="http://schemas.microsoft.com/office/drawing/2014/main" id="{D5850D95-EE8B-4B00-93A3-F2CBA9D3073C}"/>
+                  </a:ext>
+                </a:extLst>
+              </p:cNvPr>
+              <p:cNvPicPr/>
+              <p:nvPr/>
+            </p:nvPicPr>
+            <p:blipFill>
+              <a:blip r:embed="rId3"/>
+              <a:stretch>
+                <a:fillRect/>
+              </a:stretch>
+            </p:blipFill>
+            <p:spPr>
+              <a:xfrm>
+                <a:off x="2233009" y="1693699"/>
+                <a:ext cx="1222200" cy="89280"/>
+              </a:xfrm>
+              <a:prstGeom prst="rect">
+                <a:avLst/>
+              </a:prstGeom>
+            </p:spPr>
+          </p:pic>
+        </mc:Fallback>
+      </mc:AlternateContent>
+      <mc:AlternateContent xmlns:mc="http://schemas.openxmlformats.org/markup-compatibility/2006">
+        <mc:Choice xmlns:p14="http://schemas.microsoft.com/office/powerpoint/2010/main" Requires="p14">
+          <p:contentPart p14:bwMode="auto" r:id="rId4">
+            <p14:nvContentPartPr>
+              <p14:cNvPr id="5" name="Ink 4">
+                <a:extLst>
+                  <a:ext uri="{FF2B5EF4-FFF2-40B4-BE49-F238E27FC236}">
+                    <a16:creationId xmlns:a16="http://schemas.microsoft.com/office/drawing/2014/main" id="{A79A539C-B3EC-4BD8-BCF9-933EB96C2B3F}"/>
+                  </a:ext>
+                </a:extLst>
+              </p14:cNvPr>
+              <p14:cNvContentPartPr/>
+              <p14:nvPr/>
+            </p14:nvContentPartPr>
+            <p14:xfrm>
+              <a:off x="1823689" y="2117779"/>
+              <a:ext cx="1336680" cy="47520"/>
+            </p14:xfrm>
+          </p:contentPart>
+        </mc:Choice>
+        <mc:Fallback>
+          <p:pic>
+            <p:nvPicPr>
+              <p:cNvPr id="5" name="Ink 4">
+                <a:extLst>
+                  <a:ext uri="{FF2B5EF4-FFF2-40B4-BE49-F238E27FC236}">
+                    <a16:creationId xmlns:a16="http://schemas.microsoft.com/office/drawing/2014/main" id="{A79A539C-B3EC-4BD8-BCF9-933EB96C2B3F}"/>
+                  </a:ext>
+                </a:extLst>
+              </p:cNvPr>
+              <p:cNvPicPr/>
+              <p:nvPr/>
+            </p:nvPicPr>
+            <p:blipFill>
+              <a:blip r:embed="rId5"/>
+              <a:stretch>
+                <a:fillRect/>
+              </a:stretch>
+            </p:blipFill>
+            <p:spPr>
+              <a:xfrm>
+                <a:off x="1815049" y="2109139"/>
+                <a:ext cx="1354320" cy="65160"/>
+              </a:xfrm>
+              <a:prstGeom prst="rect">
+                <a:avLst/>
+              </a:prstGeom>
+            </p:spPr>
+          </p:pic>
+        </mc:Fallback>
+      </mc:AlternateContent>
+      <mc:AlternateContent xmlns:mc="http://schemas.openxmlformats.org/markup-compatibility/2006">
+        <mc:Choice xmlns:p14="http://schemas.microsoft.com/office/powerpoint/2010/main" Requires="p14">
+          <p:contentPart p14:bwMode="auto" r:id="rId6">
+            <p14:nvContentPartPr>
+              <p14:cNvPr id="6" name="Ink 5">
+                <a:extLst>
+                  <a:ext uri="{FF2B5EF4-FFF2-40B4-BE49-F238E27FC236}">
+                    <a16:creationId xmlns:a16="http://schemas.microsoft.com/office/drawing/2014/main" id="{EF9B7CDC-AF79-4DB2-84C5-F45DDC9B6480}"/>
+                  </a:ext>
+                </a:extLst>
+              </p14:cNvPr>
+              <p14:cNvContentPartPr/>
+              <p14:nvPr/>
+            </p14:nvContentPartPr>
+            <p14:xfrm>
+              <a:off x="4444849" y="2176819"/>
+              <a:ext cx="897840" cy="56880"/>
+            </p14:xfrm>
+          </p:contentPart>
+        </mc:Choice>
+        <mc:Fallback>
+          <p:pic>
+            <p:nvPicPr>
+              <p:cNvPr id="6" name="Ink 5">
+                <a:extLst>
+                  <a:ext uri="{FF2B5EF4-FFF2-40B4-BE49-F238E27FC236}">
+                    <a16:creationId xmlns:a16="http://schemas.microsoft.com/office/drawing/2014/main" id="{EF9B7CDC-AF79-4DB2-84C5-F45DDC9B6480}"/>
+                  </a:ext>
+                </a:extLst>
+              </p:cNvPr>
+              <p:cNvPicPr/>
+              <p:nvPr/>
+            </p:nvPicPr>
+            <p:blipFill>
+              <a:blip r:embed="rId7"/>
+              <a:stretch>
+                <a:fillRect/>
+              </a:stretch>
+            </p:blipFill>
+            <p:spPr>
+              <a:xfrm>
+                <a:off x="4435849" y="2168179"/>
+                <a:ext cx="915480" cy="74520"/>
+              </a:xfrm>
+              <a:prstGeom prst="rect">
+                <a:avLst/>
+              </a:prstGeom>
+            </p:spPr>
+          </p:pic>
+        </mc:Fallback>
+      </mc:AlternateContent>
+      <mc:AlternateContent xmlns:mc="http://schemas.openxmlformats.org/markup-compatibility/2006">
+        <mc:Choice xmlns:p14="http://schemas.microsoft.com/office/powerpoint/2010/main" Requires="p14">
+          <p:contentPart p14:bwMode="auto" r:id="rId8">
+            <p14:nvContentPartPr>
+              <p14:cNvPr id="7" name="Ink 6">
+                <a:extLst>
+                  <a:ext uri="{FF2B5EF4-FFF2-40B4-BE49-F238E27FC236}">
+                    <a16:creationId xmlns:a16="http://schemas.microsoft.com/office/drawing/2014/main" id="{B5180F06-BDB3-4055-85DB-D146B6FBF389}"/>
+                  </a:ext>
+                </a:extLst>
+              </p14:cNvPr>
+              <p14:cNvContentPartPr/>
+              <p14:nvPr/>
+            </p14:nvContentPartPr>
+            <p14:xfrm>
+              <a:off x="2294209" y="2585059"/>
+              <a:ext cx="745560" cy="73800"/>
+            </p14:xfrm>
+          </p:contentPart>
+        </mc:Choice>
+        <mc:Fallback>
+          <p:pic>
+            <p:nvPicPr>
+              <p:cNvPr id="7" name="Ink 6">
+                <a:extLst>
+                  <a:ext uri="{FF2B5EF4-FFF2-40B4-BE49-F238E27FC236}">
+                    <a16:creationId xmlns:a16="http://schemas.microsoft.com/office/drawing/2014/main" id="{B5180F06-BDB3-4055-85DB-D146B6FBF389}"/>
+                  </a:ext>
+                </a:extLst>
+              </p:cNvPr>
+              <p:cNvPicPr/>
+              <p:nvPr/>
+            </p:nvPicPr>
+            <p:blipFill>
+              <a:blip r:embed="rId9"/>
+              <a:stretch>
+                <a:fillRect/>
+              </a:stretch>
+            </p:blipFill>
+            <p:spPr>
+              <a:xfrm>
+                <a:off x="2285209" y="2576419"/>
+                <a:ext cx="763200" cy="91440"/>
+              </a:xfrm>
+              <a:prstGeom prst="rect">
+                <a:avLst/>
+              </a:prstGeom>
+            </p:spPr>
+          </p:pic>
+        </mc:Fallback>
+      </mc:AlternateContent>
     </p:spTree>
     <p:extLst>
       <p:ext uri="{BB962C8B-B14F-4D97-AF65-F5344CB8AC3E}">

</xml_diff>